<commit_message>
Day 18 contents updated
</commit_message>
<xml_diff>
--- a/Day17/DockerAndKubernetes_Training-Day17.pptx
+++ b/Day17/DockerAndKubernetes_Training-Day17.pptx
@@ -5,14 +5,13 @@
     <p:sldMasterId id="2147483880" r:id="rId1"/>
   </p:sldMasterIdLst>
   <p:notesMasterIdLst>
-    <p:notesMasterId r:id="rId7"/>
+    <p:notesMasterId r:id="rId6"/>
   </p:notesMasterIdLst>
   <p:sldIdLst>
     <p:sldId id="439" r:id="rId2"/>
     <p:sldId id="442" r:id="rId3"/>
     <p:sldId id="447" r:id="rId4"/>
-    <p:sldId id="448" r:id="rId5"/>
-    <p:sldId id="438" r:id="rId6"/>
+    <p:sldId id="438" r:id="rId5"/>
   </p:sldIdLst>
   <p:sldSz cx="12192000" cy="6858000"/>
   <p:notesSz cx="6858000" cy="9144000"/>
@@ -201,7 +200,7 @@
           <a:p>
             <a:fld id="{B09F413D-6E72-4B8A-80ED-A580F7C91B71}" type="datetimeFigureOut">
               <a:rPr lang="en-IN" smtClean="0"/>
-              <a:t>27-04-2023</a:t>
+              <a:t>01-05-2023</a:t>
             </a:fld>
             <a:endParaRPr lang="en-IN"/>
           </a:p>
@@ -804,7 +803,7 @@
           <a:p>
             <a:fld id="{12E8600E-B0EE-4521-BF40-4B72FBA06775}" type="datetimeFigureOut">
               <a:rPr lang="en-IN" smtClean="0"/>
-              <a:t>27-04-2023</a:t>
+              <a:t>01-05-2023</a:t>
             </a:fld>
             <a:endParaRPr lang="en-IN"/>
           </a:p>
@@ -1893,7 +1892,7 @@
             <a:fld id="{49F3E739-D457-46E5-B626-C9B182A007EE}" type="datetimeFigureOut">
               <a:rPr lang="en-US" smtClean="0"/>
               <a:pPr/>
-              <a:t>4/27/2023</a:t>
+              <a:t>5/1/2023</a:t>
             </a:fld>
             <a:endParaRPr lang="en-US"/>
           </a:p>
@@ -2875,7 +2874,7 @@
             <a:fld id="{49F3E739-D457-46E5-B626-C9B182A007EE}" type="datetimeFigureOut">
               <a:rPr lang="en-US" smtClean="0"/>
               <a:pPr/>
-              <a:t>4/27/2023</a:t>
+              <a:t>5/1/2023</a:t>
             </a:fld>
             <a:endParaRPr lang="en-US"/>
           </a:p>
@@ -4011,7 +4010,7 @@
             <a:fld id="{49F3E739-D457-46E5-B626-C9B182A007EE}" type="datetimeFigureOut">
               <a:rPr lang="en-US" smtClean="0"/>
               <a:pPr/>
-              <a:t>4/27/2023</a:t>
+              <a:t>5/1/2023</a:t>
             </a:fld>
             <a:endParaRPr lang="en-US"/>
           </a:p>
@@ -5046,7 +5045,7 @@
             <a:fld id="{49F3E739-D457-46E5-B626-C9B182A007EE}" type="datetimeFigureOut">
               <a:rPr lang="en-US" smtClean="0"/>
               <a:pPr/>
-              <a:t>4/27/2023</a:t>
+              <a:t>5/1/2023</a:t>
             </a:fld>
             <a:endParaRPr lang="en-US"/>
           </a:p>
@@ -5708,7 +5707,7 @@
             <a:fld id="{49F3E739-D457-46E5-B626-C9B182A007EE}" type="datetimeFigureOut">
               <a:rPr lang="en-US" smtClean="0"/>
               <a:pPr/>
-              <a:t>4/27/2023</a:t>
+              <a:t>5/1/2023</a:t>
             </a:fld>
             <a:endParaRPr lang="en-US"/>
           </a:p>
@@ -6571,7 +6570,7 @@
             <a:fld id="{49F3E739-D457-46E5-B626-C9B182A007EE}" type="datetimeFigureOut">
               <a:rPr lang="en-US" smtClean="0"/>
               <a:pPr/>
-              <a:t>4/27/2023</a:t>
+              <a:t>5/1/2023</a:t>
             </a:fld>
             <a:endParaRPr lang="en-US"/>
           </a:p>
@@ -6762,7 +6761,7 @@
           <a:p>
             <a:fld id="{12E8600E-B0EE-4521-BF40-4B72FBA06775}" type="datetimeFigureOut">
               <a:rPr lang="en-IN" smtClean="0"/>
-              <a:t>27-04-2023</a:t>
+              <a:t>01-05-2023</a:t>
             </a:fld>
             <a:endParaRPr lang="en-IN"/>
           </a:p>
@@ -7734,7 +7733,7 @@
           <a:p>
             <a:fld id="{12E8600E-B0EE-4521-BF40-4B72FBA06775}" type="datetimeFigureOut">
               <a:rPr lang="en-IN" smtClean="0"/>
-              <a:t>27-04-2023</a:t>
+              <a:t>01-05-2023</a:t>
             </a:fld>
             <a:endParaRPr lang="en-IN"/>
           </a:p>
@@ -7945,7 +7944,7 @@
           <a:p>
             <a:fld id="{12E8600E-B0EE-4521-BF40-4B72FBA06775}" type="datetimeFigureOut">
               <a:rPr lang="en-IN" smtClean="0"/>
-              <a:t>27-04-2023</a:t>
+              <a:t>01-05-2023</a:t>
             </a:fld>
             <a:endParaRPr lang="en-IN"/>
           </a:p>
@@ -8979,7 +8978,7 @@
           <a:p>
             <a:fld id="{12E8600E-B0EE-4521-BF40-4B72FBA06775}" type="datetimeFigureOut">
               <a:rPr lang="en-IN" smtClean="0"/>
-              <a:t>27-04-2023</a:t>
+              <a:t>01-05-2023</a:t>
             </a:fld>
             <a:endParaRPr lang="en-IN"/>
           </a:p>
@@ -9251,7 +9250,7 @@
           <a:p>
             <a:fld id="{12E8600E-B0EE-4521-BF40-4B72FBA06775}" type="datetimeFigureOut">
               <a:rPr lang="en-IN" smtClean="0"/>
-              <a:t>27-04-2023</a:t>
+              <a:t>01-05-2023</a:t>
             </a:fld>
             <a:endParaRPr lang="en-IN"/>
           </a:p>
@@ -9662,7 +9661,7 @@
             <a:fld id="{49F3E739-D457-46E5-B626-C9B182A007EE}" type="datetimeFigureOut">
               <a:rPr lang="en-US" smtClean="0"/>
               <a:pPr/>
-              <a:t>4/27/2023</a:t>
+              <a:t>5/1/2023</a:t>
             </a:fld>
             <a:endParaRPr lang="en-US"/>
           </a:p>
@@ -9790,7 +9789,7 @@
           <a:p>
             <a:fld id="{12E8600E-B0EE-4521-BF40-4B72FBA06775}" type="datetimeFigureOut">
               <a:rPr lang="en-IN" smtClean="0"/>
-              <a:t>27-04-2023</a:t>
+              <a:t>01-05-2023</a:t>
             </a:fld>
             <a:endParaRPr lang="en-IN"/>
           </a:p>
@@ -9885,7 +9884,7 @@
           <a:p>
             <a:fld id="{12E8600E-B0EE-4521-BF40-4B72FBA06775}" type="datetimeFigureOut">
               <a:rPr lang="en-IN" smtClean="0"/>
-              <a:t>27-04-2023</a:t>
+              <a:t>01-05-2023</a:t>
             </a:fld>
             <a:endParaRPr lang="en-IN"/>
           </a:p>
@@ -10966,7 +10965,7 @@
           <a:p>
             <a:fld id="{12E8600E-B0EE-4521-BF40-4B72FBA06775}" type="datetimeFigureOut">
               <a:rPr lang="en-IN" smtClean="0"/>
-              <a:t>27-04-2023</a:t>
+              <a:t>01-05-2023</a:t>
             </a:fld>
             <a:endParaRPr lang="en-IN"/>
           </a:p>
@@ -12075,7 +12074,7 @@
             <a:fld id="{49F3E739-D457-46E5-B626-C9B182A007EE}" type="datetimeFigureOut">
               <a:rPr lang="en-US" smtClean="0"/>
               <a:pPr/>
-              <a:t>4/27/2023</a:t>
+              <a:t>5/1/2023</a:t>
             </a:fld>
             <a:endParaRPr lang="en-US"/>
           </a:p>
@@ -13074,7 +13073,7 @@
             <a:fld id="{49F3E739-D457-46E5-B626-C9B182A007EE}" type="datetimeFigureOut">
               <a:rPr lang="en-US" smtClean="0"/>
               <a:pPr/>
-              <a:t>4/27/2023</a:t>
+              <a:t>5/1/2023</a:t>
             </a:fld>
             <a:endParaRPr lang="en-US"/>
           </a:p>
@@ -14215,7 +14214,7 @@
         </p:spPr>
         <p:txBody>
           <a:bodyPr>
-            <a:normAutofit fontScale="92500" lnSpcReduction="20000"/>
+            <a:normAutofit lnSpcReduction="10000"/>
           </a:bodyPr>
           <a:lstStyle/>
           <a:p>
@@ -14310,16 +14309,6 @@
             <a:endParaRPr lang="en-US" dirty="0"/>
           </a:p>
           <a:p>
-            <a:r>
-              <a:rPr lang="en-US" dirty="0"/>
-              <a:t>Docker Swarm Networking concept: </a:t>
-            </a:r>
-            <a:r>
-              <a:rPr lang="en-US" dirty="0">
-                <a:hlinkClick r:id="rId9"/>
-              </a:rPr>
-              <a:t>https://docs.docker.com/engine/swarm/networking/</a:t>
-            </a:r>
             <a:endParaRPr lang="en-US" dirty="0"/>
           </a:p>
           <a:p>
@@ -14359,177 +14348,6 @@
 </file>
 
 <file path=ppt/slides/slide4.xml><?xml version="1.0" encoding="utf-8"?>
-<p:sld xmlns:a="http://schemas.openxmlformats.org/drawingml/2006/main" xmlns:r="http://schemas.openxmlformats.org/officeDocument/2006/relationships" xmlns:p="http://schemas.openxmlformats.org/presentationml/2006/main">
-  <p:cSld>
-    <p:spTree>
-      <p:nvGrpSpPr>
-        <p:cNvPr id="1" name=""/>
-        <p:cNvGrpSpPr/>
-        <p:nvPr/>
-      </p:nvGrpSpPr>
-      <p:grpSpPr>
-        <a:xfrm>
-          <a:off x="0" y="0"/>
-          <a:ext cx="0" cy="0"/>
-          <a:chOff x="0" y="0"/>
-          <a:chExt cx="0" cy="0"/>
-        </a:xfrm>
-      </p:grpSpPr>
-      <p:sp>
-        <p:nvSpPr>
-          <p:cNvPr id="2" name="Title 1">
-            <a:extLst>
-              <a:ext uri="{FF2B5EF4-FFF2-40B4-BE49-F238E27FC236}">
-                <a16:creationId xmlns:a16="http://schemas.microsoft.com/office/drawing/2014/main" id="{4888F7A2-6541-7804-044E-92BB697BCBF3}"/>
-              </a:ext>
-            </a:extLst>
-          </p:cNvPr>
-          <p:cNvSpPr>
-            <a:spLocks noGrp="1"/>
-          </p:cNvSpPr>
-          <p:nvPr>
-            <p:ph type="title"/>
-          </p:nvPr>
-        </p:nvSpPr>
-        <p:spPr/>
-        <p:txBody>
-          <a:bodyPr/>
-          <a:lstStyle/>
-          <a:p>
-            <a:r>
-              <a:rPr lang="en-US" dirty="0"/>
-              <a:t>Docker Swarm – More Insight</a:t>
-            </a:r>
-            <a:endParaRPr lang="en-IN" dirty="0"/>
-          </a:p>
-        </p:txBody>
-      </p:sp>
-      <p:sp>
-        <p:nvSpPr>
-          <p:cNvPr id="3" name="Content Placeholder 2">
-            <a:extLst>
-              <a:ext uri="{FF2B5EF4-FFF2-40B4-BE49-F238E27FC236}">
-                <a16:creationId xmlns:a16="http://schemas.microsoft.com/office/drawing/2014/main" id="{3DBDBB4D-9668-0EB8-5926-A1461797187C}"/>
-              </a:ext>
-            </a:extLst>
-          </p:cNvPr>
-          <p:cNvSpPr>
-            <a:spLocks noGrp="1"/>
-          </p:cNvSpPr>
-          <p:nvPr>
-            <p:ph idx="1"/>
-          </p:nvPr>
-        </p:nvSpPr>
-        <p:spPr>
-          <a:xfrm>
-            <a:off x="1154954" y="2603500"/>
-            <a:ext cx="8825659" cy="3966112"/>
-          </a:xfrm>
-        </p:spPr>
-        <p:txBody>
-          <a:bodyPr>
-            <a:normAutofit fontScale="92500" lnSpcReduction="10000"/>
-          </a:bodyPr>
-          <a:lstStyle/>
-          <a:p>
-            <a:r>
-              <a:rPr lang="en-US" dirty="0"/>
-              <a:t>Run Docker Engine in Swarm Mode - https://docs.docker.com/engine/swarm/swarm-mode/</a:t>
-            </a:r>
-          </a:p>
-          <a:p>
-            <a:r>
-              <a:rPr lang="en-US" dirty="0"/>
-              <a:t>Join Node -https://docs.docker.com/engine/swarm/join-nodes/</a:t>
-            </a:r>
-          </a:p>
-          <a:p>
-            <a:r>
-              <a:rPr lang="en-US" dirty="0"/>
-              <a:t>Manage nodes in Swarm - https://docs.docker.com/engine/swarm/manage-nodes/</a:t>
-            </a:r>
-          </a:p>
-          <a:p>
-            <a:r>
-              <a:rPr lang="en-US" dirty="0"/>
-              <a:t>Deploy service in Swarm mode - </a:t>
-            </a:r>
-            <a:r>
-              <a:rPr lang="en-US" dirty="0">
-                <a:hlinkClick r:id="rId2"/>
-              </a:rPr>
-              <a:t>https://docs.docker.com/engine/swarm/services/</a:t>
-            </a:r>
-            <a:endParaRPr lang="en-US" dirty="0"/>
-          </a:p>
-          <a:p>
-            <a:r>
-              <a:rPr lang="en-US" dirty="0"/>
-              <a:t>Store configuration details - https://docs.docker.com/engine/swarm/configs/</a:t>
-            </a:r>
-          </a:p>
-          <a:p>
-            <a:r>
-              <a:rPr lang="en-US" dirty="0"/>
-              <a:t>Store sensitive information - https://docs.docker.com/engine/swarm/secrets/</a:t>
-            </a:r>
-          </a:p>
-          <a:p>
-            <a:r>
-              <a:rPr lang="en-US" dirty="0"/>
-              <a:t>Security with Docker Swarm - </a:t>
-            </a:r>
-            <a:r>
-              <a:rPr lang="en-US" dirty="0">
-                <a:hlinkClick r:id="rId3"/>
-              </a:rPr>
-              <a:t>https://docs.docker.com/engine/swarm/how-swarm-mode-works/pki/</a:t>
-            </a:r>
-            <a:endParaRPr lang="en-US" dirty="0"/>
-          </a:p>
-          <a:p>
-            <a:r>
-              <a:rPr lang="en-US" dirty="0"/>
-              <a:t>Raft Consensus - https://docs.docker.com/engine/swarm/raft/</a:t>
-            </a:r>
-          </a:p>
-          <a:p>
-            <a:pPr marL="0" indent="0">
-              <a:buNone/>
-            </a:pPr>
-            <a:endParaRPr lang="en-US" dirty="0"/>
-          </a:p>
-          <a:p>
-            <a:endParaRPr lang="en-US" dirty="0"/>
-          </a:p>
-          <a:p>
-            <a:endParaRPr lang="en-US" dirty="0"/>
-          </a:p>
-          <a:p>
-            <a:endParaRPr lang="en-US" dirty="0"/>
-          </a:p>
-          <a:p>
-            <a:endParaRPr lang="en-US" dirty="0"/>
-          </a:p>
-          <a:p>
-            <a:endParaRPr lang="en-IN" dirty="0"/>
-          </a:p>
-        </p:txBody>
-      </p:sp>
-    </p:spTree>
-    <p:extLst>
-      <p:ext uri="{BB962C8B-B14F-4D97-AF65-F5344CB8AC3E}">
-        <p14:creationId xmlns:p14="http://schemas.microsoft.com/office/powerpoint/2010/main" val="614320893"/>
-      </p:ext>
-    </p:extLst>
-  </p:cSld>
-  <p:clrMapOvr>
-    <a:masterClrMapping/>
-  </p:clrMapOvr>
-</p:sld>
-</file>
-
-<file path=ppt/slides/slide5.xml><?xml version="1.0" encoding="utf-8"?>
 <p:sld xmlns:a="http://schemas.openxmlformats.org/drawingml/2006/main" xmlns:r="http://schemas.openxmlformats.org/officeDocument/2006/relationships" xmlns:p="http://schemas.openxmlformats.org/presentationml/2006/main">
   <p:cSld>
     <p:spTree>

</xml_diff>